<commit_message>
updated uart1 wire color- yellow and  white are swapped at other connector end
</commit_message>
<xml_diff>
--- a/LineCamera/TSL1401-BBBlue-interface.pptx
+++ b/LineCamera/TSL1401-BBBlue-interface.pptx
@@ -254,7 +254,7 @@
           <a:p>
             <a:fld id="{4CAF78D2-4F0E-46AF-8E97-3791D1ACB5E8}" type="datetimeFigureOut">
               <a:rPr lang="en-US" smtClean="0"/>
-              <a:t>2/27/2019</a:t>
+              <a:t>3/15/2019</a:t>
             </a:fld>
             <a:endParaRPr lang="en-US"/>
           </a:p>
@@ -424,7 +424,7 @@
           <a:p>
             <a:fld id="{4CAF78D2-4F0E-46AF-8E97-3791D1ACB5E8}" type="datetimeFigureOut">
               <a:rPr lang="en-US" smtClean="0"/>
-              <a:t>2/27/2019</a:t>
+              <a:t>3/15/2019</a:t>
             </a:fld>
             <a:endParaRPr lang="en-US"/>
           </a:p>
@@ -604,7 +604,7 @@
           <a:p>
             <a:fld id="{4CAF78D2-4F0E-46AF-8E97-3791D1ACB5E8}" type="datetimeFigureOut">
               <a:rPr lang="en-US" smtClean="0"/>
-              <a:t>2/27/2019</a:t>
+              <a:t>3/15/2019</a:t>
             </a:fld>
             <a:endParaRPr lang="en-US"/>
           </a:p>
@@ -774,7 +774,7 @@
           <a:p>
             <a:fld id="{4CAF78D2-4F0E-46AF-8E97-3791D1ACB5E8}" type="datetimeFigureOut">
               <a:rPr lang="en-US" smtClean="0"/>
-              <a:t>2/27/2019</a:t>
+              <a:t>3/15/2019</a:t>
             </a:fld>
             <a:endParaRPr lang="en-US"/>
           </a:p>
@@ -1018,7 +1018,7 @@
           <a:p>
             <a:fld id="{4CAF78D2-4F0E-46AF-8E97-3791D1ACB5E8}" type="datetimeFigureOut">
               <a:rPr lang="en-US" smtClean="0"/>
-              <a:t>2/27/2019</a:t>
+              <a:t>3/15/2019</a:t>
             </a:fld>
             <a:endParaRPr lang="en-US"/>
           </a:p>
@@ -1250,7 +1250,7 @@
           <a:p>
             <a:fld id="{4CAF78D2-4F0E-46AF-8E97-3791D1ACB5E8}" type="datetimeFigureOut">
               <a:rPr lang="en-US" smtClean="0"/>
-              <a:t>2/27/2019</a:t>
+              <a:t>3/15/2019</a:t>
             </a:fld>
             <a:endParaRPr lang="en-US"/>
           </a:p>
@@ -1617,7 +1617,7 @@
           <a:p>
             <a:fld id="{4CAF78D2-4F0E-46AF-8E97-3791D1ACB5E8}" type="datetimeFigureOut">
               <a:rPr lang="en-US" smtClean="0"/>
-              <a:t>2/27/2019</a:t>
+              <a:t>3/15/2019</a:t>
             </a:fld>
             <a:endParaRPr lang="en-US"/>
           </a:p>
@@ -1735,7 +1735,7 @@
           <a:p>
             <a:fld id="{4CAF78D2-4F0E-46AF-8E97-3791D1ACB5E8}" type="datetimeFigureOut">
               <a:rPr lang="en-US" smtClean="0"/>
-              <a:t>2/27/2019</a:t>
+              <a:t>3/15/2019</a:t>
             </a:fld>
             <a:endParaRPr lang="en-US"/>
           </a:p>
@@ -1830,7 +1830,7 @@
           <a:p>
             <a:fld id="{4CAF78D2-4F0E-46AF-8E97-3791D1ACB5E8}" type="datetimeFigureOut">
               <a:rPr lang="en-US" smtClean="0"/>
-              <a:t>2/27/2019</a:t>
+              <a:t>3/15/2019</a:t>
             </a:fld>
             <a:endParaRPr lang="en-US"/>
           </a:p>
@@ -2107,7 +2107,7 @@
           <a:p>
             <a:fld id="{4CAF78D2-4F0E-46AF-8E97-3791D1ACB5E8}" type="datetimeFigureOut">
               <a:rPr lang="en-US" smtClean="0"/>
-              <a:t>2/27/2019</a:t>
+              <a:t>3/15/2019</a:t>
             </a:fld>
             <a:endParaRPr lang="en-US"/>
           </a:p>
@@ -2364,7 +2364,7 @@
           <a:p>
             <a:fld id="{4CAF78D2-4F0E-46AF-8E97-3791D1ACB5E8}" type="datetimeFigureOut">
               <a:rPr lang="en-US" smtClean="0"/>
-              <a:t>2/27/2019</a:t>
+              <a:t>3/15/2019</a:t>
             </a:fld>
             <a:endParaRPr lang="en-US"/>
           </a:p>
@@ -2577,7 +2577,7 @@
           <a:p>
             <a:fld id="{4CAF78D2-4F0E-46AF-8E97-3791D1ACB5E8}" type="datetimeFigureOut">
               <a:rPr lang="en-US" smtClean="0"/>
-              <a:t>2/27/2019</a:t>
+              <a:t>3/15/2019</a:t>
             </a:fld>
             <a:endParaRPr lang="en-US"/>
           </a:p>
@@ -6072,8 +6072,8 @@
         </p:nvSpPr>
         <p:spPr>
           <a:xfrm>
-            <a:off x="7003697" y="5602390"/>
-            <a:ext cx="454355" cy="369332"/>
+            <a:off x="6563504" y="5601679"/>
+            <a:ext cx="1231299" cy="369332"/>
           </a:xfrm>
           <a:prstGeom prst="rect">
             <a:avLst/>
@@ -6087,8 +6087,24 @@
           <a:lstStyle/>
           <a:p>
             <a:r>
+              <a:rPr lang="en-US" dirty="0" err="1"/>
+              <a:t>y</a:t>
+            </a:r>
+            <a:r>
               <a:rPr lang="en-US" dirty="0" err="1" smtClean="0"/>
-              <a:t>yel</a:t>
+              <a:t>el</a:t>
+            </a:r>
+            <a:r>
+              <a:rPr lang="en-US" dirty="0" smtClean="0"/>
+              <a:t> or </a:t>
+            </a:r>
+            <a:r>
+              <a:rPr lang="en-US" dirty="0" err="1" smtClean="0"/>
+              <a:t>wht</a:t>
+            </a:r>
+            <a:r>
+              <a:rPr lang="en-US" dirty="0" smtClean="0"/>
+              <a:t>?</a:t>
             </a:r>
             <a:endParaRPr lang="en-US" dirty="0"/>
           </a:p>
@@ -6102,8 +6118,8 @@
         </p:nvSpPr>
         <p:spPr>
           <a:xfrm>
-            <a:off x="6954850" y="5302819"/>
-            <a:ext cx="546432" cy="369332"/>
+            <a:off x="6563505" y="5291991"/>
+            <a:ext cx="1231299" cy="369332"/>
           </a:xfrm>
           <a:prstGeom prst="rect">
             <a:avLst/>
@@ -6117,8 +6133,24 @@
           <a:lstStyle/>
           <a:p>
             <a:r>
+              <a:rPr lang="en-US" dirty="0" err="1"/>
+              <a:t>w</a:t>
+            </a:r>
+            <a:r>
               <a:rPr lang="en-US" dirty="0" err="1" smtClean="0"/>
-              <a:t>wht</a:t>
+              <a:t>ht</a:t>
+            </a:r>
+            <a:r>
+              <a:rPr lang="en-US" dirty="0" smtClean="0"/>
+              <a:t> or </a:t>
+            </a:r>
+            <a:r>
+              <a:rPr lang="en-US" dirty="0" err="1" smtClean="0"/>
+              <a:t>yel</a:t>
+            </a:r>
+            <a:r>
+              <a:rPr lang="en-US" dirty="0" smtClean="0"/>
+              <a:t>?</a:t>
             </a:r>
             <a:endParaRPr lang="en-US" dirty="0"/>
           </a:p>

</xml_diff>